<commit_message>
Update personal adoc and devguide
</commit_message>
<xml_diff>
--- a/docs/diagrams/TrackAddCommandSequenceDiagram.pptx
+++ b/docs/diagrams/TrackAddCommandSequenceDiagram.pptx
@@ -104,6 +104,11 @@
       </a:defRPr>
     </a:lvl9pPr>
   </p:defaultTextStyle>
+  <p:extLst>
+    <p:ext uri="{EFAFB233-063F-42B5-8137-9DF3F51BA10A}">
+      <p15:sldGuideLst xmlns:p15="http://schemas.microsoft.com/office/powerpoint/2012/main"/>
+    </p:ext>
+  </p:extLst>
 </p:presentation>
 </file>
 
@@ -2969,7 +2974,7 @@
           <p:cNvPr id="4" name="Rectangle 65">
             <a:extLst>
               <a:ext uri="{FF2B5EF4-FFF2-40B4-BE49-F238E27FC236}">
-                <a16:creationId xmlns="" xmlns:a16="http://schemas.microsoft.com/office/drawing/2014/main" xmlns:lc="http://schemas.openxmlformats.org/drawingml/2006/lockedCanvas" id="{985B975E-ECCD-8141-8AAB-7382C5AC6742}"/>
+                <a16:creationId xmlns:lc="http://schemas.openxmlformats.org/drawingml/2006/lockedCanvas" xmlns:a16="http://schemas.microsoft.com/office/drawing/2014/main" xmlns="" id="{985B975E-ECCD-8141-8AAB-7382C5AC6742}"/>
               </a:ext>
             </a:extLst>
           </p:cNvPr>
@@ -2978,8 +2983,8 @@
         </p:nvSpPr>
         <p:spPr>
           <a:xfrm>
-            <a:off x="1191748" y="480098"/>
-            <a:ext cx="9372024" cy="5988339"/>
+            <a:off x="563878" y="480098"/>
+            <a:ext cx="9999894" cy="5988339"/>
           </a:xfrm>
           <a:prstGeom prst="roundRect">
             <a:avLst>
@@ -3130,7 +3135,7 @@
           <p:cNvPr id="5" name="Rectangle 4">
             <a:extLst>
               <a:ext uri="{FF2B5EF4-FFF2-40B4-BE49-F238E27FC236}">
-                <a16:creationId xmlns="" xmlns:a16="http://schemas.microsoft.com/office/drawing/2014/main" xmlns:lc="http://schemas.openxmlformats.org/drawingml/2006/lockedCanvas" id="{0551762C-12FB-D747-88F7-528EFCC6F125}"/>
+                <a16:creationId xmlns:lc="http://schemas.openxmlformats.org/drawingml/2006/lockedCanvas" xmlns:a16="http://schemas.microsoft.com/office/drawing/2014/main" xmlns="" id="{0551762C-12FB-D747-88F7-528EFCC6F125}"/>
               </a:ext>
             </a:extLst>
           </p:cNvPr>
@@ -3289,7 +3294,7 @@
           <p:cNvPr id="1881" name="Rectangle 65">
             <a:extLst>
               <a:ext uri="{FF2B5EF4-FFF2-40B4-BE49-F238E27FC236}">
-                <a16:creationId xmlns="" xmlns:a16="http://schemas.microsoft.com/office/drawing/2014/main" xmlns:lc="http://schemas.openxmlformats.org/drawingml/2006/lockedCanvas" id="{985B975E-ECCD-8141-8AAB-7382C5AC6742}"/>
+                <a16:creationId xmlns:lc="http://schemas.openxmlformats.org/drawingml/2006/lockedCanvas" xmlns:a16="http://schemas.microsoft.com/office/drawing/2014/main" xmlns="" id="{985B975E-ECCD-8141-8AAB-7382C5AC6742}"/>
               </a:ext>
             </a:extLst>
           </p:cNvPr>
@@ -3453,7 +3458,7 @@
           <p:cNvPr id="6" name="Straight Connector 5">
             <a:extLst>
               <a:ext uri="{FF2B5EF4-FFF2-40B4-BE49-F238E27FC236}">
-                <a16:creationId xmlns="" xmlns:a16="http://schemas.microsoft.com/office/drawing/2014/main" xmlns:lc="http://schemas.openxmlformats.org/drawingml/2006/lockedCanvas" id="{69CD458B-CC87-004B-AD8D-5EC4BCF4F391}"/>
+                <a16:creationId xmlns:lc="http://schemas.openxmlformats.org/drawingml/2006/lockedCanvas" xmlns:a16="http://schemas.microsoft.com/office/drawing/2014/main" xmlns="" id="{69CD458B-CC87-004B-AD8D-5EC4BCF4F391}"/>
               </a:ext>
             </a:extLst>
           </p:cNvPr>
@@ -3496,7 +3501,7 @@
           <p:cNvPr id="7" name="Rectangle 6">
             <a:extLst>
               <a:ext uri="{FF2B5EF4-FFF2-40B4-BE49-F238E27FC236}">
-                <a16:creationId xmlns="" xmlns:a16="http://schemas.microsoft.com/office/drawing/2014/main" xmlns:lc="http://schemas.openxmlformats.org/drawingml/2006/lockedCanvas" id="{05978320-BA93-5744-87F7-5823DCCFD48D}"/>
+                <a16:creationId xmlns:lc="http://schemas.openxmlformats.org/drawingml/2006/lockedCanvas" xmlns:a16="http://schemas.microsoft.com/office/drawing/2014/main" xmlns="" id="{05978320-BA93-5744-87F7-5823DCCFD48D}"/>
               </a:ext>
             </a:extLst>
           </p:cNvPr>
@@ -3643,7 +3648,7 @@
           <p:cNvPr id="8" name="Rectangle 7">
             <a:extLst>
               <a:ext uri="{FF2B5EF4-FFF2-40B4-BE49-F238E27FC236}">
-                <a16:creationId xmlns="" xmlns:a16="http://schemas.microsoft.com/office/drawing/2014/main" xmlns:lc="http://schemas.openxmlformats.org/drawingml/2006/lockedCanvas" id="{129B421B-6280-704B-B3E6-D87D5BBB1176}"/>
+                <a16:creationId xmlns:lc="http://schemas.openxmlformats.org/drawingml/2006/lockedCanvas" xmlns:a16="http://schemas.microsoft.com/office/drawing/2014/main" xmlns="" id="{129B421B-6280-704B-B3E6-D87D5BBB1176}"/>
               </a:ext>
             </a:extLst>
           </p:cNvPr>
@@ -3810,7 +3815,7 @@
           <p:cNvPr id="9" name="Straight Connector 8">
             <a:extLst>
               <a:ext uri="{FF2B5EF4-FFF2-40B4-BE49-F238E27FC236}">
-                <a16:creationId xmlns="" xmlns:a16="http://schemas.microsoft.com/office/drawing/2014/main" xmlns:lc="http://schemas.openxmlformats.org/drawingml/2006/lockedCanvas" id="{C80C2956-4C7D-AE46-89D2-873C0609F888}"/>
+                <a16:creationId xmlns:lc="http://schemas.openxmlformats.org/drawingml/2006/lockedCanvas" xmlns:a16="http://schemas.microsoft.com/office/drawing/2014/main" xmlns="" id="{C80C2956-4C7D-AE46-89D2-873C0609F888}"/>
               </a:ext>
             </a:extLst>
           </p:cNvPr>
@@ -3855,7 +3860,7 @@
           <p:cNvPr id="10" name="Rectangle 9">
             <a:extLst>
               <a:ext uri="{FF2B5EF4-FFF2-40B4-BE49-F238E27FC236}">
-                <a16:creationId xmlns="" xmlns:a16="http://schemas.microsoft.com/office/drawing/2014/main" xmlns:lc="http://schemas.openxmlformats.org/drawingml/2006/lockedCanvas" id="{4035F84C-5438-844D-9EB2-A65284130B72}"/>
+                <a16:creationId xmlns:lc="http://schemas.openxmlformats.org/drawingml/2006/lockedCanvas" xmlns:a16="http://schemas.microsoft.com/office/drawing/2014/main" xmlns="" id="{4035F84C-5438-844D-9EB2-A65284130B72}"/>
               </a:ext>
             </a:extLst>
           </p:cNvPr>
@@ -4006,7 +4011,7 @@
           <p:cNvPr id="11" name="Straight Arrow Connector 10">
             <a:extLst>
               <a:ext uri="{FF2B5EF4-FFF2-40B4-BE49-F238E27FC236}">
-                <a16:creationId xmlns="" xmlns:a16="http://schemas.microsoft.com/office/drawing/2014/main" xmlns:lc="http://schemas.openxmlformats.org/drawingml/2006/lockedCanvas" id="{469F3D56-988E-7B49-AC9E-C3484C941296}"/>
+                <a16:creationId xmlns:lc="http://schemas.openxmlformats.org/drawingml/2006/lockedCanvas" xmlns:a16="http://schemas.microsoft.com/office/drawing/2014/main" xmlns="" id="{469F3D56-988E-7B49-AC9E-C3484C941296}"/>
               </a:ext>
             </a:extLst>
           </p:cNvPr>
@@ -4048,7 +4053,7 @@
           <p:cNvPr id="12" name="Straight Arrow Connector 11">
             <a:extLst>
               <a:ext uri="{FF2B5EF4-FFF2-40B4-BE49-F238E27FC236}">
-                <a16:creationId xmlns="" xmlns:a16="http://schemas.microsoft.com/office/drawing/2014/main" xmlns:lc="http://schemas.openxmlformats.org/drawingml/2006/lockedCanvas" id="{3774D3F9-EA50-474A-988C-A067044F008B}"/>
+                <a16:creationId xmlns:lc="http://schemas.openxmlformats.org/drawingml/2006/lockedCanvas" xmlns:a16="http://schemas.microsoft.com/office/drawing/2014/main" xmlns="" id="{3774D3F9-EA50-474A-988C-A067044F008B}"/>
               </a:ext>
             </a:extLst>
           </p:cNvPr>
@@ -4090,7 +4095,7 @@
           <p:cNvPr id="13" name="TextBox 12">
             <a:extLst>
               <a:ext uri="{FF2B5EF4-FFF2-40B4-BE49-F238E27FC236}">
-                <a16:creationId xmlns="" xmlns:a16="http://schemas.microsoft.com/office/drawing/2014/main" xmlns:lc="http://schemas.openxmlformats.org/drawingml/2006/lockedCanvas" id="{7EE69CB6-2665-9E43-B6BA-22FE82AD7010}"/>
+                <a16:creationId xmlns:lc="http://schemas.openxmlformats.org/drawingml/2006/lockedCanvas" xmlns:a16="http://schemas.microsoft.com/office/drawing/2014/main" xmlns="" id="{7EE69CB6-2665-9E43-B6BA-22FE82AD7010}"/>
               </a:ext>
             </a:extLst>
           </p:cNvPr>
@@ -4269,7 +4274,7 @@
           <p:cNvPr id="14" name="TextBox 13">
             <a:extLst>
               <a:ext uri="{FF2B5EF4-FFF2-40B4-BE49-F238E27FC236}">
-                <a16:creationId xmlns="" xmlns:a16="http://schemas.microsoft.com/office/drawing/2014/main" xmlns:lc="http://schemas.openxmlformats.org/drawingml/2006/lockedCanvas" id="{43B0DCE9-3046-DA4C-A273-50225E0BFE3E}"/>
+                <a16:creationId xmlns:lc="http://schemas.openxmlformats.org/drawingml/2006/lockedCanvas" xmlns:a16="http://schemas.microsoft.com/office/drawing/2014/main" xmlns="" id="{43B0DCE9-3046-DA4C-A273-50225E0BFE3E}"/>
               </a:ext>
             </a:extLst>
           </p:cNvPr>
@@ -4398,7 +4403,7 @@
           <p:cNvPr id="15" name="Straight Arrow Connector 14">
             <a:extLst>
               <a:ext uri="{FF2B5EF4-FFF2-40B4-BE49-F238E27FC236}">
-                <a16:creationId xmlns="" xmlns:a16="http://schemas.microsoft.com/office/drawing/2014/main" xmlns:lc="http://schemas.openxmlformats.org/drawingml/2006/lockedCanvas" id="{7F127668-EFB3-E843-BB3A-36994EE70565}"/>
+                <a16:creationId xmlns:lc="http://schemas.openxmlformats.org/drawingml/2006/lockedCanvas" xmlns:a16="http://schemas.microsoft.com/office/drawing/2014/main" xmlns="" id="{7F127668-EFB3-E843-BB3A-36994EE70565}"/>
               </a:ext>
             </a:extLst>
           </p:cNvPr>
@@ -4442,7 +4447,7 @@
           <p:cNvPr id="16" name="Straight Arrow Connector 15">
             <a:extLst>
               <a:ext uri="{FF2B5EF4-FFF2-40B4-BE49-F238E27FC236}">
-                <a16:creationId xmlns="" xmlns:a16="http://schemas.microsoft.com/office/drawing/2014/main" xmlns:lc="http://schemas.openxmlformats.org/drawingml/2006/lockedCanvas" id="{B4588287-9A1C-CC40-B3D6-4B42DEB2AF80}"/>
+                <a16:creationId xmlns:lc="http://schemas.openxmlformats.org/drawingml/2006/lockedCanvas" xmlns:a16="http://schemas.microsoft.com/office/drawing/2014/main" xmlns="" id="{B4588287-9A1C-CC40-B3D6-4B42DEB2AF80}"/>
               </a:ext>
             </a:extLst>
           </p:cNvPr>
@@ -4451,8 +4456,8 @@
         </p:nvCxnSpPr>
         <p:spPr>
           <a:xfrm flipV="1">
-            <a:off x="1191748" y="6103657"/>
-            <a:ext cx="2031250" cy="10337"/>
+            <a:off x="530011" y="6103658"/>
+            <a:ext cx="2692987" cy="10336"/>
           </a:xfrm>
           <a:prstGeom prst="straightConnector1">
             <a:avLst/>
@@ -4486,7 +4491,7 @@
           <p:cNvPr id="17" name="Rectangle 16">
             <a:extLst>
               <a:ext uri="{FF2B5EF4-FFF2-40B4-BE49-F238E27FC236}">
-                <a16:creationId xmlns="" xmlns:a16="http://schemas.microsoft.com/office/drawing/2014/main" xmlns:lc="http://schemas.openxmlformats.org/drawingml/2006/lockedCanvas" id="{ADB8BAA8-51D1-DD4D-98BB-601FA882F17C}"/>
+                <a16:creationId xmlns:lc="http://schemas.openxmlformats.org/drawingml/2006/lockedCanvas" xmlns:a16="http://schemas.microsoft.com/office/drawing/2014/main" xmlns="" id="{ADB8BAA8-51D1-DD4D-98BB-601FA882F17C}"/>
               </a:ext>
             </a:extLst>
           </p:cNvPr>
@@ -4645,7 +4650,7 @@
           <p:cNvPr id="18" name="Straight Arrow Connector 17">
             <a:extLst>
               <a:ext uri="{FF2B5EF4-FFF2-40B4-BE49-F238E27FC236}">
-                <a16:creationId xmlns="" xmlns:a16="http://schemas.microsoft.com/office/drawing/2014/main" xmlns:lc="http://schemas.openxmlformats.org/drawingml/2006/lockedCanvas" id="{38F882EC-AB0F-3F4E-9D9A-D792C0988DD0}"/>
+                <a16:creationId xmlns:lc="http://schemas.openxmlformats.org/drawingml/2006/lockedCanvas" xmlns:a16="http://schemas.microsoft.com/office/drawing/2014/main" xmlns="" id="{38F882EC-AB0F-3F4E-9D9A-D792C0988DD0}"/>
               </a:ext>
             </a:extLst>
           </p:cNvPr>
@@ -4687,7 +4692,7 @@
           <p:cNvPr id="19" name="Rectangle 18">
             <a:extLst>
               <a:ext uri="{FF2B5EF4-FFF2-40B4-BE49-F238E27FC236}">
-                <a16:creationId xmlns="" xmlns:a16="http://schemas.microsoft.com/office/drawing/2014/main" xmlns:lc="http://schemas.openxmlformats.org/drawingml/2006/lockedCanvas" id="{5A1EBCF5-C188-864D-82AE-6038E60747EB}"/>
+                <a16:creationId xmlns:lc="http://schemas.openxmlformats.org/drawingml/2006/lockedCanvas" xmlns:a16="http://schemas.microsoft.com/office/drawing/2014/main" xmlns="" id="{5A1EBCF5-C188-864D-82AE-6038E60747EB}"/>
               </a:ext>
             </a:extLst>
           </p:cNvPr>
@@ -4834,7 +4839,7 @@
           <p:cNvPr id="20" name="Straight Connector 19">
             <a:extLst>
               <a:ext uri="{FF2B5EF4-FFF2-40B4-BE49-F238E27FC236}">
-                <a16:creationId xmlns="" xmlns:a16="http://schemas.microsoft.com/office/drawing/2014/main" xmlns:lc="http://schemas.openxmlformats.org/drawingml/2006/lockedCanvas" id="{DBA0768F-D484-464E-ADFB-48B242B49CC1}"/>
+                <a16:creationId xmlns:lc="http://schemas.openxmlformats.org/drawingml/2006/lockedCanvas" xmlns:a16="http://schemas.microsoft.com/office/drawing/2014/main" xmlns="" id="{DBA0768F-D484-464E-ADFB-48B242B49CC1}"/>
               </a:ext>
             </a:extLst>
           </p:cNvPr>
@@ -4877,7 +4882,7 @@
           <p:cNvPr id="21" name="Rectangle 20">
             <a:extLst>
               <a:ext uri="{FF2B5EF4-FFF2-40B4-BE49-F238E27FC236}">
-                <a16:creationId xmlns="" xmlns:a16="http://schemas.microsoft.com/office/drawing/2014/main" xmlns:lc="http://schemas.openxmlformats.org/drawingml/2006/lockedCanvas" id="{C5DA7E1C-30BE-7349-9CBA-44AF2325220C}"/>
+                <a16:creationId xmlns:lc="http://schemas.openxmlformats.org/drawingml/2006/lockedCanvas" xmlns:a16="http://schemas.microsoft.com/office/drawing/2014/main" xmlns="" id="{C5DA7E1C-30BE-7349-9CBA-44AF2325220C}"/>
               </a:ext>
             </a:extLst>
           </p:cNvPr>
@@ -5028,7 +5033,7 @@
           <p:cNvPr id="22" name="Straight Arrow Connector 21">
             <a:extLst>
               <a:ext uri="{FF2B5EF4-FFF2-40B4-BE49-F238E27FC236}">
-                <a16:creationId xmlns="" xmlns:a16="http://schemas.microsoft.com/office/drawing/2014/main" xmlns:lc="http://schemas.openxmlformats.org/drawingml/2006/lockedCanvas" id="{FFFEE658-E00E-F64A-98D3-1602FF351F39}"/>
+                <a16:creationId xmlns:lc="http://schemas.openxmlformats.org/drawingml/2006/lockedCanvas" xmlns:a16="http://schemas.microsoft.com/office/drawing/2014/main" xmlns="" id="{FFFEE658-E00E-F64A-98D3-1602FF351F39}"/>
               </a:ext>
             </a:extLst>
           </p:cNvPr>
@@ -5070,7 +5075,7 @@
           <p:cNvPr id="24" name="Straight Arrow Connector 23">
             <a:extLst>
               <a:ext uri="{FF2B5EF4-FFF2-40B4-BE49-F238E27FC236}">
-                <a16:creationId xmlns="" xmlns:a16="http://schemas.microsoft.com/office/drawing/2014/main" xmlns:lc="http://schemas.openxmlformats.org/drawingml/2006/lockedCanvas" id="{BEDAA94D-C2F4-1E46-99F5-43A4AB4F00B3}"/>
+                <a16:creationId xmlns:lc="http://schemas.openxmlformats.org/drawingml/2006/lockedCanvas" xmlns:a16="http://schemas.microsoft.com/office/drawing/2014/main" xmlns="" id="{BEDAA94D-C2F4-1E46-99F5-43A4AB4F00B3}"/>
               </a:ext>
             </a:extLst>
           </p:cNvPr>
@@ -5114,7 +5119,7 @@
           <p:cNvPr id="25" name="TextBox 24">
             <a:extLst>
               <a:ext uri="{FF2B5EF4-FFF2-40B4-BE49-F238E27FC236}">
-                <a16:creationId xmlns="" xmlns:a16="http://schemas.microsoft.com/office/drawing/2014/main" xmlns:lc="http://schemas.openxmlformats.org/drawingml/2006/lockedCanvas" id="{2A11D860-313A-0C44-89D4-A6FE52500F1F}"/>
+                <a16:creationId xmlns:lc="http://schemas.openxmlformats.org/drawingml/2006/lockedCanvas" xmlns:a16="http://schemas.microsoft.com/office/drawing/2014/main" xmlns="" id="{2A11D860-313A-0C44-89D4-A6FE52500F1F}"/>
               </a:ext>
             </a:extLst>
           </p:cNvPr>
@@ -5260,7 +5265,7 @@
           <p:cNvPr id="27" name="TextBox 26">
             <a:extLst>
               <a:ext uri="{FF2B5EF4-FFF2-40B4-BE49-F238E27FC236}">
-                <a16:creationId xmlns="" xmlns:a16="http://schemas.microsoft.com/office/drawing/2014/main" xmlns:lc="http://schemas.openxmlformats.org/drawingml/2006/lockedCanvas" id="{615D5A7C-57A3-894D-B399-0E74AE566FB0}"/>
+                <a16:creationId xmlns:lc="http://schemas.openxmlformats.org/drawingml/2006/lockedCanvas" xmlns:a16="http://schemas.microsoft.com/office/drawing/2014/main" xmlns="" id="{615D5A7C-57A3-894D-B399-0E74AE566FB0}"/>
               </a:ext>
             </a:extLst>
           </p:cNvPr>
@@ -5391,7 +5396,7 @@
           <p:cNvPr id="28" name="TextBox 27">
             <a:extLst>
               <a:ext uri="{FF2B5EF4-FFF2-40B4-BE49-F238E27FC236}">
-                <a16:creationId xmlns="" xmlns:a16="http://schemas.microsoft.com/office/drawing/2014/main" xmlns:lc="http://schemas.openxmlformats.org/drawingml/2006/lockedCanvas" id="{19DCFCD9-3934-0D40-9F92-71FDA8725312}"/>
+                <a16:creationId xmlns:lc="http://schemas.openxmlformats.org/drawingml/2006/lockedCanvas" xmlns:a16="http://schemas.microsoft.com/office/drawing/2014/main" xmlns="" id="{19DCFCD9-3934-0D40-9F92-71FDA8725312}"/>
               </a:ext>
             </a:extLst>
           </p:cNvPr>
@@ -5522,7 +5527,7 @@
           <p:cNvPr id="29" name="Rectangle 28">
             <a:extLst>
               <a:ext uri="{FF2B5EF4-FFF2-40B4-BE49-F238E27FC236}">
-                <a16:creationId xmlns="" xmlns:a16="http://schemas.microsoft.com/office/drawing/2014/main" xmlns:lc="http://schemas.openxmlformats.org/drawingml/2006/lockedCanvas" id="{4D6B0298-7DAD-4446-8456-A80A71CD8F2B}"/>
+                <a16:creationId xmlns:lc="http://schemas.openxmlformats.org/drawingml/2006/lockedCanvas" xmlns:a16="http://schemas.microsoft.com/office/drawing/2014/main" xmlns="" id="{4D6B0298-7DAD-4446-8456-A80A71CD8F2B}"/>
               </a:ext>
             </a:extLst>
           </p:cNvPr>
@@ -5666,15 +5671,7 @@
                   <a:schemeClr val="bg1"/>
                 </a:solidFill>
               </a:rPr>
-              <a:t>r</a:t>
-            </a:r>
-            <a:r>
-              <a:rPr lang="en-US" sz="1000" smtClean="0">
-                <a:solidFill>
-                  <a:schemeClr val="bg1"/>
-                </a:solidFill>
-              </a:rPr>
-              <a:t>esult :Command</a:t>
+              <a:t>result :Command</a:t>
             </a:r>
             <a:r>
               <a:rPr lang="en-US" sz="1000" dirty="0" smtClean="0">
@@ -5705,7 +5702,7 @@
           <p:cNvPr id="30" name="Rectangle 29">
             <a:extLst>
               <a:ext uri="{FF2B5EF4-FFF2-40B4-BE49-F238E27FC236}">
-                <a16:creationId xmlns="" xmlns:a16="http://schemas.microsoft.com/office/drawing/2014/main" xmlns:lc="http://schemas.openxmlformats.org/drawingml/2006/lockedCanvas" id="{3D9AD64A-A869-4E40-BA31-3C3FA67E9B11}"/>
+                <a16:creationId xmlns:lc="http://schemas.openxmlformats.org/drawingml/2006/lockedCanvas" xmlns:a16="http://schemas.microsoft.com/office/drawing/2014/main" xmlns="" id="{3D9AD64A-A869-4E40-BA31-3C3FA67E9B11}"/>
               </a:ext>
             </a:extLst>
           </p:cNvPr>
@@ -5852,7 +5849,7 @@
           <p:cNvPr id="31" name="Straight Arrow Connector 30">
             <a:extLst>
               <a:ext uri="{FF2B5EF4-FFF2-40B4-BE49-F238E27FC236}">
-                <a16:creationId xmlns="" xmlns:a16="http://schemas.microsoft.com/office/drawing/2014/main" xmlns:lc="http://schemas.openxmlformats.org/drawingml/2006/lockedCanvas" id="{F5BA8E55-AEC4-6F46-BB9E-32AB54134D11}"/>
+                <a16:creationId xmlns:lc="http://schemas.openxmlformats.org/drawingml/2006/lockedCanvas" xmlns:a16="http://schemas.microsoft.com/office/drawing/2014/main" xmlns="" id="{F5BA8E55-AEC4-6F46-BB9E-32AB54134D11}"/>
               </a:ext>
             </a:extLst>
           </p:cNvPr>
@@ -5898,7 +5895,7 @@
           <p:cNvPr id="33" name="Rectangle 32">
             <a:extLst>
               <a:ext uri="{FF2B5EF4-FFF2-40B4-BE49-F238E27FC236}">
-                <a16:creationId xmlns="" xmlns:a16="http://schemas.microsoft.com/office/drawing/2014/main" xmlns:lc="http://schemas.openxmlformats.org/drawingml/2006/lockedCanvas" id="{AC2ABB37-8F6F-0E4F-8FEB-8E423C268A9A}"/>
+                <a16:creationId xmlns:lc="http://schemas.openxmlformats.org/drawingml/2006/lockedCanvas" xmlns:a16="http://schemas.microsoft.com/office/drawing/2014/main" xmlns="" id="{AC2ABB37-8F6F-0E4F-8FEB-8E423C268A9A}"/>
               </a:ext>
             </a:extLst>
           </p:cNvPr>
@@ -6065,7 +6062,7 @@
           <p:cNvPr id="34" name="Straight Arrow Connector 33">
             <a:extLst>
               <a:ext uri="{FF2B5EF4-FFF2-40B4-BE49-F238E27FC236}">
-                <a16:creationId xmlns="" xmlns:a16="http://schemas.microsoft.com/office/drawing/2014/main" xmlns:lc="http://schemas.openxmlformats.org/drawingml/2006/lockedCanvas" id="{A48A02F1-3710-D241-BC02-3635BD06EF19}"/>
+                <a16:creationId xmlns:lc="http://schemas.openxmlformats.org/drawingml/2006/lockedCanvas" xmlns:a16="http://schemas.microsoft.com/office/drawing/2014/main" xmlns="" id="{A48A02F1-3710-D241-BC02-3635BD06EF19}"/>
               </a:ext>
             </a:extLst>
           </p:cNvPr>
@@ -6105,7 +6102,7 @@
           <p:cNvPr id="35" name="Rectangle 34">
             <a:extLst>
               <a:ext uri="{FF2B5EF4-FFF2-40B4-BE49-F238E27FC236}">
-                <a16:creationId xmlns="" xmlns:a16="http://schemas.microsoft.com/office/drawing/2014/main" xmlns:lc="http://schemas.openxmlformats.org/drawingml/2006/lockedCanvas" id="{30337ED1-690D-5345-B017-5E7F7F68E06F}"/>
+                <a16:creationId xmlns:lc="http://schemas.openxmlformats.org/drawingml/2006/lockedCanvas" xmlns:a16="http://schemas.microsoft.com/office/drawing/2014/main" xmlns="" id="{30337ED1-690D-5345-B017-5E7F7F68E06F}"/>
               </a:ext>
             </a:extLst>
           </p:cNvPr>
@@ -6252,7 +6249,7 @@
           <p:cNvPr id="36" name="Straight Connector 35">
             <a:extLst>
               <a:ext uri="{FF2B5EF4-FFF2-40B4-BE49-F238E27FC236}">
-                <a16:creationId xmlns="" xmlns:a16="http://schemas.microsoft.com/office/drawing/2014/main" xmlns:lc="http://schemas.openxmlformats.org/drawingml/2006/lockedCanvas" id="{91422993-68CB-E747-BBEF-9EF0766DFFED}"/>
+                <a16:creationId xmlns:lc="http://schemas.openxmlformats.org/drawingml/2006/lockedCanvas" xmlns:a16="http://schemas.microsoft.com/office/drawing/2014/main" xmlns="" id="{91422993-68CB-E747-BBEF-9EF0766DFFED}"/>
               </a:ext>
             </a:extLst>
           </p:cNvPr>
@@ -6297,7 +6294,7 @@
           <p:cNvPr id="37" name="Rectangle 36">
             <a:extLst>
               <a:ext uri="{FF2B5EF4-FFF2-40B4-BE49-F238E27FC236}">
-                <a16:creationId xmlns="" xmlns:a16="http://schemas.microsoft.com/office/drawing/2014/main" xmlns:lc="http://schemas.openxmlformats.org/drawingml/2006/lockedCanvas" id="{903A3F7B-3AB4-8D4F-AF46-A8BDBC8627BB}"/>
+                <a16:creationId xmlns:lc="http://schemas.openxmlformats.org/drawingml/2006/lockedCanvas" xmlns:a16="http://schemas.microsoft.com/office/drawing/2014/main" xmlns="" id="{903A3F7B-3AB4-8D4F-AF46-A8BDBC8627BB}"/>
               </a:ext>
             </a:extLst>
           </p:cNvPr>
@@ -6444,7 +6441,7 @@
           <p:cNvPr id="38" name="Straight Arrow Connector 37">
             <a:extLst>
               <a:ext uri="{FF2B5EF4-FFF2-40B4-BE49-F238E27FC236}">
-                <a16:creationId xmlns="" xmlns:a16="http://schemas.microsoft.com/office/drawing/2014/main" xmlns:lc="http://schemas.openxmlformats.org/drawingml/2006/lockedCanvas" id="{A66AB6D2-DD9D-B640-93EB-45930A16B733}"/>
+                <a16:creationId xmlns:lc="http://schemas.openxmlformats.org/drawingml/2006/lockedCanvas" xmlns:a16="http://schemas.microsoft.com/office/drawing/2014/main" xmlns="" id="{A66AB6D2-DD9D-B640-93EB-45930A16B733}"/>
               </a:ext>
             </a:extLst>
           </p:cNvPr>
@@ -6488,7 +6485,7 @@
           <p:cNvPr id="39" name="Straight Arrow Connector 38">
             <a:extLst>
               <a:ext uri="{FF2B5EF4-FFF2-40B4-BE49-F238E27FC236}">
-                <a16:creationId xmlns="" xmlns:a16="http://schemas.microsoft.com/office/drawing/2014/main" xmlns:lc="http://schemas.openxmlformats.org/drawingml/2006/lockedCanvas" id="{A3FCDCAF-68D1-CA4A-98D4-F01CDCB60992}"/>
+                <a16:creationId xmlns:lc="http://schemas.openxmlformats.org/drawingml/2006/lockedCanvas" xmlns:a16="http://schemas.microsoft.com/office/drawing/2014/main" xmlns="" id="{A3FCDCAF-68D1-CA4A-98D4-F01CDCB60992}"/>
               </a:ext>
             </a:extLst>
           </p:cNvPr>
@@ -6528,7 +6525,7 @@
           <p:cNvPr id="40" name="Straight Arrow Connector 39">
             <a:extLst>
               <a:ext uri="{FF2B5EF4-FFF2-40B4-BE49-F238E27FC236}">
-                <a16:creationId xmlns="" xmlns:a16="http://schemas.microsoft.com/office/drawing/2014/main" xmlns:lc="http://schemas.openxmlformats.org/drawingml/2006/lockedCanvas" id="{C8FA98C5-702A-7E4A-ADE1-44DCC847695C}"/>
+                <a16:creationId xmlns:lc="http://schemas.openxmlformats.org/drawingml/2006/lockedCanvas" xmlns:a16="http://schemas.microsoft.com/office/drawing/2014/main" xmlns="" id="{C8FA98C5-702A-7E4A-ADE1-44DCC847695C}"/>
               </a:ext>
             </a:extLst>
           </p:cNvPr>
@@ -6570,7 +6567,7 @@
           <p:cNvPr id="41" name="Straight Arrow Connector 40">
             <a:extLst>
               <a:ext uri="{FF2B5EF4-FFF2-40B4-BE49-F238E27FC236}">
-                <a16:creationId xmlns="" xmlns:a16="http://schemas.microsoft.com/office/drawing/2014/main" xmlns:lc="http://schemas.openxmlformats.org/drawingml/2006/lockedCanvas" id="{20EA68D2-DDF8-E44D-91A4-FB8C6FF3998E}"/>
+                <a16:creationId xmlns:lc="http://schemas.openxmlformats.org/drawingml/2006/lockedCanvas" xmlns:a16="http://schemas.microsoft.com/office/drawing/2014/main" xmlns="" id="{20EA68D2-DDF8-E44D-91A4-FB8C6FF3998E}"/>
               </a:ext>
             </a:extLst>
           </p:cNvPr>
@@ -6616,7 +6613,7 @@
           <p:cNvPr id="42" name="TextBox 41">
             <a:extLst>
               <a:ext uri="{FF2B5EF4-FFF2-40B4-BE49-F238E27FC236}">
-                <a16:creationId xmlns="" xmlns:a16="http://schemas.microsoft.com/office/drawing/2014/main" xmlns:lc="http://schemas.openxmlformats.org/drawingml/2006/lockedCanvas" id="{3AE8757F-1660-8441-BD1A-5DF596971B80}"/>
+                <a16:creationId xmlns:lc="http://schemas.openxmlformats.org/drawingml/2006/lockedCanvas" xmlns:a16="http://schemas.microsoft.com/office/drawing/2014/main" xmlns="" id="{3AE8757F-1660-8441-BD1A-5DF596971B80}"/>
               </a:ext>
             </a:extLst>
           </p:cNvPr>
@@ -6749,7 +6746,7 @@
           <p:cNvPr id="43" name="TextBox 42">
             <a:extLst>
               <a:ext uri="{FF2B5EF4-FFF2-40B4-BE49-F238E27FC236}">
-                <a16:creationId xmlns="" xmlns:a16="http://schemas.microsoft.com/office/drawing/2014/main" xmlns:lc="http://schemas.openxmlformats.org/drawingml/2006/lockedCanvas" id="{DE915C77-2913-424E-929E-1BBDC5BEEEE1}"/>
+                <a16:creationId xmlns:lc="http://schemas.openxmlformats.org/drawingml/2006/lockedCanvas" xmlns:a16="http://schemas.microsoft.com/office/drawing/2014/main" xmlns="" id="{DE915C77-2913-424E-929E-1BBDC5BEEEE1}"/>
               </a:ext>
             </a:extLst>
           </p:cNvPr>
@@ -6895,7 +6892,7 @@
           <p:cNvPr id="44" name="Straight Arrow Connector 43">
             <a:extLst>
               <a:ext uri="{FF2B5EF4-FFF2-40B4-BE49-F238E27FC236}">
-                <a16:creationId xmlns="" xmlns:a16="http://schemas.microsoft.com/office/drawing/2014/main" xmlns:lc="http://schemas.openxmlformats.org/drawingml/2006/lockedCanvas" id="{4413A09E-AC52-4842-A3BF-79521F90E8DE}"/>
+                <a16:creationId xmlns:lc="http://schemas.openxmlformats.org/drawingml/2006/lockedCanvas" xmlns:a16="http://schemas.microsoft.com/office/drawing/2014/main" xmlns="" id="{4413A09E-AC52-4842-A3BF-79521F90E8DE}"/>
               </a:ext>
             </a:extLst>
           </p:cNvPr>
@@ -6937,7 +6934,7 @@
           <p:cNvPr id="45" name="Rectangle 44">
             <a:extLst>
               <a:ext uri="{FF2B5EF4-FFF2-40B4-BE49-F238E27FC236}">
-                <a16:creationId xmlns="" xmlns:a16="http://schemas.microsoft.com/office/drawing/2014/main" xmlns:lc="http://schemas.openxmlformats.org/drawingml/2006/lockedCanvas" id="{F1184410-19F5-C541-BB70-EA57BA202CFF}"/>
+                <a16:creationId xmlns:lc="http://schemas.openxmlformats.org/drawingml/2006/lockedCanvas" xmlns:a16="http://schemas.microsoft.com/office/drawing/2014/main" xmlns="" id="{F1184410-19F5-C541-BB70-EA57BA202CFF}"/>
               </a:ext>
             </a:extLst>
           </p:cNvPr>
@@ -7104,7 +7101,7 @@
           <p:cNvPr id="46" name="Rectangle 45">
             <a:extLst>
               <a:ext uri="{FF2B5EF4-FFF2-40B4-BE49-F238E27FC236}">
-                <a16:creationId xmlns="" xmlns:a16="http://schemas.microsoft.com/office/drawing/2014/main" xmlns:lc="http://schemas.openxmlformats.org/drawingml/2006/lockedCanvas" id="{D2148D5C-2D64-8946-A32E-D64AE9F74A07}"/>
+                <a16:creationId xmlns:lc="http://schemas.openxmlformats.org/drawingml/2006/lockedCanvas" xmlns:a16="http://schemas.microsoft.com/office/drawing/2014/main" xmlns="" id="{D2148D5C-2D64-8946-A32E-D64AE9F74A07}"/>
               </a:ext>
             </a:extLst>
           </p:cNvPr>
@@ -7251,7 +7248,7 @@
           <p:cNvPr id="47" name="Straight Arrow Connector 46">
             <a:extLst>
               <a:ext uri="{FF2B5EF4-FFF2-40B4-BE49-F238E27FC236}">
-                <a16:creationId xmlns="" xmlns:a16="http://schemas.microsoft.com/office/drawing/2014/main" xmlns:lc="http://schemas.openxmlformats.org/drawingml/2006/lockedCanvas" id="{83B1CAC5-8E05-194F-AA11-168CB02BBAEE}"/>
+                <a16:creationId xmlns:lc="http://schemas.openxmlformats.org/drawingml/2006/lockedCanvas" xmlns:a16="http://schemas.microsoft.com/office/drawing/2014/main" xmlns="" id="{83B1CAC5-8E05-194F-AA11-168CB02BBAEE}"/>
               </a:ext>
             </a:extLst>
           </p:cNvPr>
@@ -7298,7 +7295,7 @@
           <p:cNvPr id="48" name="Straight Connector 47">
             <a:extLst>
               <a:ext uri="{FF2B5EF4-FFF2-40B4-BE49-F238E27FC236}">
-                <a16:creationId xmlns="" xmlns:a16="http://schemas.microsoft.com/office/drawing/2014/main" xmlns:lc="http://schemas.openxmlformats.org/drawingml/2006/lockedCanvas" id="{0FEEF8A0-2CE5-914E-BFEB-0259962CFD0F}"/>
+                <a16:creationId xmlns:lc="http://schemas.openxmlformats.org/drawingml/2006/lockedCanvas" xmlns:a16="http://schemas.microsoft.com/office/drawing/2014/main" xmlns="" id="{0FEEF8A0-2CE5-914E-BFEB-0259962CFD0F}"/>
               </a:ext>
             </a:extLst>
           </p:cNvPr>
@@ -7344,7 +7341,7 @@
           <p:cNvPr id="87" name="TextBox 86">
             <a:extLst>
               <a:ext uri="{FF2B5EF4-FFF2-40B4-BE49-F238E27FC236}">
-                <a16:creationId xmlns="" xmlns:a16="http://schemas.microsoft.com/office/drawing/2014/main" xmlns:lc="http://schemas.openxmlformats.org/drawingml/2006/lockedCanvas" id="{7EE69CB6-2665-9E43-B6BA-22FE82AD7010}"/>
+                <a16:creationId xmlns:lc="http://schemas.openxmlformats.org/drawingml/2006/lockedCanvas" xmlns:a16="http://schemas.microsoft.com/office/drawing/2014/main" xmlns="" id="{7EE69CB6-2665-9E43-B6BA-22FE82AD7010}"/>
               </a:ext>
             </a:extLst>
           </p:cNvPr>
@@ -7546,7 +7543,7 @@
           <p:cNvPr id="88" name="TextBox 87">
             <a:extLst>
               <a:ext uri="{FF2B5EF4-FFF2-40B4-BE49-F238E27FC236}">
-                <a16:creationId xmlns="" xmlns:a16="http://schemas.microsoft.com/office/drawing/2014/main" xmlns:lc="http://schemas.openxmlformats.org/drawingml/2006/lockedCanvas" id="{7EE69CB6-2665-9E43-B6BA-22FE82AD7010}"/>
+                <a16:creationId xmlns:lc="http://schemas.openxmlformats.org/drawingml/2006/lockedCanvas" xmlns:a16="http://schemas.microsoft.com/office/drawing/2014/main" xmlns="" id="{7EE69CB6-2665-9E43-B6BA-22FE82AD7010}"/>
               </a:ext>
             </a:extLst>
           </p:cNvPr>
@@ -7717,7 +7714,7 @@
           <p:cNvPr id="1834" name="TextBox 1833">
             <a:extLst>
               <a:ext uri="{FF2B5EF4-FFF2-40B4-BE49-F238E27FC236}">
-                <a16:creationId xmlns="" xmlns:a16="http://schemas.microsoft.com/office/drawing/2014/main" xmlns:lc="http://schemas.openxmlformats.org/drawingml/2006/lockedCanvas" id="{DE915C77-2913-424E-929E-1BBDC5BEEEE1}"/>
+                <a16:creationId xmlns:lc="http://schemas.openxmlformats.org/drawingml/2006/lockedCanvas" xmlns:a16="http://schemas.microsoft.com/office/drawing/2014/main" xmlns="" id="{DE915C77-2913-424E-929E-1BBDC5BEEEE1}"/>
               </a:ext>
             </a:extLst>
           </p:cNvPr>
@@ -7848,7 +7845,7 @@
           <p:cNvPr id="1835" name="TextBox 1834">
             <a:extLst>
               <a:ext uri="{FF2B5EF4-FFF2-40B4-BE49-F238E27FC236}">
-                <a16:creationId xmlns="" xmlns:a16="http://schemas.microsoft.com/office/drawing/2014/main" xmlns:lc="http://schemas.openxmlformats.org/drawingml/2006/lockedCanvas" id="{DE915C77-2913-424E-929E-1BBDC5BEEEE1}"/>
+                <a16:creationId xmlns:lc="http://schemas.openxmlformats.org/drawingml/2006/lockedCanvas" xmlns:a16="http://schemas.microsoft.com/office/drawing/2014/main" xmlns="" id="{DE915C77-2913-424E-929E-1BBDC5BEEEE1}"/>
               </a:ext>
             </a:extLst>
           </p:cNvPr>
@@ -7979,7 +7976,7 @@
           <p:cNvPr id="1859" name="Straight Arrow Connector 1858">
             <a:extLst>
               <a:ext uri="{FF2B5EF4-FFF2-40B4-BE49-F238E27FC236}">
-                <a16:creationId xmlns="" xmlns:a16="http://schemas.microsoft.com/office/drawing/2014/main" xmlns:lc="http://schemas.openxmlformats.org/drawingml/2006/lockedCanvas" id="{A1F27313-9025-CC48-97F6-AAC6F2A54E3B}"/>
+                <a16:creationId xmlns:lc="http://schemas.openxmlformats.org/drawingml/2006/lockedCanvas" xmlns:a16="http://schemas.microsoft.com/office/drawing/2014/main" xmlns="" id="{A1F27313-9025-CC48-97F6-AAC6F2A54E3B}"/>
               </a:ext>
             </a:extLst>
           </p:cNvPr>
@@ -8023,7 +8020,7 @@
           <p:cNvPr id="1860" name="Straight Arrow Connector 1859">
             <a:extLst>
               <a:ext uri="{FF2B5EF4-FFF2-40B4-BE49-F238E27FC236}">
-                <a16:creationId xmlns="" xmlns:a16="http://schemas.microsoft.com/office/drawing/2014/main" xmlns:lc="http://schemas.openxmlformats.org/drawingml/2006/lockedCanvas" id="{FFFEE658-E00E-F64A-98D3-1602FF351F39}"/>
+                <a16:creationId xmlns:lc="http://schemas.openxmlformats.org/drawingml/2006/lockedCanvas" xmlns:a16="http://schemas.microsoft.com/office/drawing/2014/main" xmlns="" id="{FFFEE658-E00E-F64A-98D3-1602FF351F39}"/>
               </a:ext>
             </a:extLst>
           </p:cNvPr>
@@ -8065,7 +8062,7 @@
           <p:cNvPr id="1861" name="TextBox 1860">
             <a:extLst>
               <a:ext uri="{FF2B5EF4-FFF2-40B4-BE49-F238E27FC236}">
-                <a16:creationId xmlns="" xmlns:a16="http://schemas.microsoft.com/office/drawing/2014/main" xmlns:lc="http://schemas.openxmlformats.org/drawingml/2006/lockedCanvas" id="{2A11D860-313A-0C44-89D4-A6FE52500F1F}"/>
+                <a16:creationId xmlns:lc="http://schemas.openxmlformats.org/drawingml/2006/lockedCanvas" xmlns:a16="http://schemas.microsoft.com/office/drawing/2014/main" xmlns="" id="{2A11D860-313A-0C44-89D4-A6FE52500F1F}"/>
               </a:ext>
             </a:extLst>
           </p:cNvPr>
@@ -8212,7 +8209,7 @@
           <p:cNvPr id="1868" name="Straight Arrow Connector 1867">
             <a:extLst>
               <a:ext uri="{FF2B5EF4-FFF2-40B4-BE49-F238E27FC236}">
-                <a16:creationId xmlns="" xmlns:a16="http://schemas.microsoft.com/office/drawing/2014/main" xmlns:lc="http://schemas.openxmlformats.org/drawingml/2006/lockedCanvas" id="{FFFEE658-E00E-F64A-98D3-1602FF351F39}"/>
+                <a16:creationId xmlns:lc="http://schemas.openxmlformats.org/drawingml/2006/lockedCanvas" xmlns:a16="http://schemas.microsoft.com/office/drawing/2014/main" xmlns="" id="{FFFEE658-E00E-F64A-98D3-1602FF351F39}"/>
               </a:ext>
             </a:extLst>
           </p:cNvPr>
@@ -8254,7 +8251,7 @@
           <p:cNvPr id="1869" name="TextBox 1868">
             <a:extLst>
               <a:ext uri="{FF2B5EF4-FFF2-40B4-BE49-F238E27FC236}">
-                <a16:creationId xmlns="" xmlns:a16="http://schemas.microsoft.com/office/drawing/2014/main" xmlns:lc="http://schemas.openxmlformats.org/drawingml/2006/lockedCanvas" id="{2A11D860-313A-0C44-89D4-A6FE52500F1F}"/>
+                <a16:creationId xmlns:lc="http://schemas.openxmlformats.org/drawingml/2006/lockedCanvas" xmlns:a16="http://schemas.microsoft.com/office/drawing/2014/main" xmlns="" id="{2A11D860-313A-0C44-89D4-A6FE52500F1F}"/>
               </a:ext>
             </a:extLst>
           </p:cNvPr>

</xml_diff>